<commit_message>
create function for computing cross correlation
</commit_message>
<xml_diff>
--- a/figure_ppt/ppt_figures.pptx
+++ b/figure_ppt/ppt_figures.pptx
@@ -3779,565 +3779,586 @@
           <a:chExt cx="0" cy="0"/>
         </a:xfrm>
       </p:grpSpPr>
-      <p:cxnSp>
-        <p:nvCxnSpPr>
-          <p:cNvPr id="7" name="Straight Arrow Connector 6">
-            <a:extLst>
-              <a:ext uri="{FF2B5EF4-FFF2-40B4-BE49-F238E27FC236}">
-                <a16:creationId xmlns:a16="http://schemas.microsoft.com/office/drawing/2014/main" id="{AC2A28C9-F90D-3849-8FE8-D6EE7614AA29}"/>
-              </a:ext>
-            </a:extLst>
-          </p:cNvPr>
-          <p:cNvCxnSpPr/>
+      <p:grpSp>
+        <p:nvGrpSpPr>
+          <p:cNvPr id="35" name="Group 34">
+            <a:extLst>
+              <a:ext uri="{FF2B5EF4-FFF2-40B4-BE49-F238E27FC236}">
+                <a16:creationId xmlns:a16="http://schemas.microsoft.com/office/drawing/2014/main" id="{EF373B12-3CBC-0144-AF01-11A5CA0D3A77}"/>
+              </a:ext>
+            </a:extLst>
+          </p:cNvPr>
+          <p:cNvGrpSpPr/>
           <p:nvPr/>
-        </p:nvCxnSpPr>
-        <p:spPr>
+        </p:nvGrpSpPr>
+        <p:grpSpPr>
           <a:xfrm>
-            <a:off x="1203158" y="1925053"/>
-            <a:ext cx="9881937" cy="0"/>
+            <a:off x="1010652" y="1502447"/>
+            <a:ext cx="9881937" cy="2351177"/>
+            <a:chOff x="1203158" y="1518489"/>
+            <a:chExt cx="9881937" cy="2351177"/>
           </a:xfrm>
-          <a:prstGeom prst="straightConnector1">
-            <a:avLst/>
-          </a:prstGeom>
-          <a:ln>
-            <a:headEnd type="none"/>
-            <a:tailEnd type="stealth" w="lg" len="lg"/>
-          </a:ln>
-        </p:spPr>
-        <p:style>
-          <a:lnRef idx="1">
-            <a:schemeClr val="accent1"/>
-          </a:lnRef>
-          <a:fillRef idx="0">
-            <a:schemeClr val="accent1"/>
-          </a:fillRef>
-          <a:effectRef idx="0">
-            <a:schemeClr val="accent1"/>
-          </a:effectRef>
-          <a:fontRef idx="minor">
-            <a:schemeClr val="tx1"/>
-          </a:fontRef>
-        </p:style>
-      </p:cxnSp>
-      <p:sp>
-        <p:nvSpPr>
-          <p:cNvPr id="9" name="Oval 8">
-            <a:extLst>
-              <a:ext uri="{FF2B5EF4-FFF2-40B4-BE49-F238E27FC236}">
-                <a16:creationId xmlns:a16="http://schemas.microsoft.com/office/drawing/2014/main" id="{750583F8-9A59-0F44-A23F-FFAA5FAA2F69}"/>
-              </a:ext>
-            </a:extLst>
-          </p:cNvPr>
-          <p:cNvSpPr/>
-          <p:nvPr/>
-        </p:nvSpPr>
-        <p:spPr>
-          <a:xfrm>
-            <a:off x="2210469" y="2283660"/>
-            <a:ext cx="1604210" cy="994611"/>
-          </a:xfrm>
-          <a:prstGeom prst="ellipse">
-            <a:avLst/>
-          </a:prstGeom>
-          <a:solidFill>
-            <a:schemeClr val="accent1">
-              <a:alpha val="17000"/>
-            </a:schemeClr>
-          </a:solidFill>
-          <a:ln>
+        </p:grpSpPr>
+        <p:cxnSp>
+          <p:nvCxnSpPr>
+            <p:cNvPr id="7" name="Straight Arrow Connector 6">
+              <a:extLst>
+                <a:ext uri="{FF2B5EF4-FFF2-40B4-BE49-F238E27FC236}">
+                  <a16:creationId xmlns:a16="http://schemas.microsoft.com/office/drawing/2014/main" id="{AC2A28C9-F90D-3849-8FE8-D6EE7614AA29}"/>
+                </a:ext>
+              </a:extLst>
+            </p:cNvPr>
+            <p:cNvCxnSpPr/>
+            <p:nvPr/>
+          </p:nvCxnSpPr>
+          <p:spPr>
+            <a:xfrm>
+              <a:off x="1203158" y="1925053"/>
+              <a:ext cx="9881937" cy="0"/>
+            </a:xfrm>
+            <a:prstGeom prst="straightConnector1">
+              <a:avLst/>
+            </a:prstGeom>
+            <a:ln>
+              <a:headEnd type="none"/>
+              <a:tailEnd type="stealth" w="lg" len="lg"/>
+            </a:ln>
+          </p:spPr>
+          <p:style>
+            <a:lnRef idx="1">
+              <a:schemeClr val="accent1"/>
+            </a:lnRef>
+            <a:fillRef idx="0">
+              <a:schemeClr val="accent1"/>
+            </a:fillRef>
+            <a:effectRef idx="0">
+              <a:schemeClr val="accent1"/>
+            </a:effectRef>
+            <a:fontRef idx="minor">
+              <a:schemeClr val="tx1"/>
+            </a:fontRef>
+          </p:style>
+        </p:cxnSp>
+        <p:sp>
+          <p:nvSpPr>
+            <p:cNvPr id="9" name="Oval 8">
+              <a:extLst>
+                <a:ext uri="{FF2B5EF4-FFF2-40B4-BE49-F238E27FC236}">
+                  <a16:creationId xmlns:a16="http://schemas.microsoft.com/office/drawing/2014/main" id="{750583F8-9A59-0F44-A23F-FFAA5FAA2F69}"/>
+                </a:ext>
+              </a:extLst>
+            </p:cNvPr>
+            <p:cNvSpPr/>
+            <p:nvPr/>
+          </p:nvSpPr>
+          <p:spPr>
+            <a:xfrm>
+              <a:off x="2210469" y="2283660"/>
+              <a:ext cx="1604210" cy="994611"/>
+            </a:xfrm>
+            <a:prstGeom prst="ellipse">
+              <a:avLst/>
+            </a:prstGeom>
             <a:solidFill>
+              <a:schemeClr val="accent1">
+                <a:alpha val="17000"/>
+              </a:schemeClr>
+            </a:solidFill>
+            <a:ln>
+              <a:solidFill>
+                <a:schemeClr val="accent1">
+                  <a:shade val="50000"/>
+                </a:schemeClr>
+              </a:solidFill>
+            </a:ln>
+          </p:spPr>
+          <p:style>
+            <a:lnRef idx="2">
               <a:schemeClr val="accent1">
                 <a:shade val="50000"/>
               </a:schemeClr>
+            </a:lnRef>
+            <a:fillRef idx="1">
+              <a:schemeClr val="accent1"/>
+            </a:fillRef>
+            <a:effectRef idx="0">
+              <a:schemeClr val="accent1"/>
+            </a:effectRef>
+            <a:fontRef idx="minor">
+              <a:schemeClr val="lt1"/>
+            </a:fontRef>
+          </p:style>
+          <p:txBody>
+            <a:bodyPr rtlCol="0" anchor="ctr"/>
+            <a:lstStyle/>
+            <a:p>
+              <a:pPr algn="ctr"/>
+              <a:endParaRPr lang="en-GB" dirty="0"/>
+            </a:p>
+          </p:txBody>
+        </p:sp>
+        <p:sp>
+          <p:nvSpPr>
+            <p:cNvPr id="17" name="Oval 16">
+              <a:extLst>
+                <a:ext uri="{FF2B5EF4-FFF2-40B4-BE49-F238E27FC236}">
+                  <a16:creationId xmlns:a16="http://schemas.microsoft.com/office/drawing/2014/main" id="{74FB0B7A-8C0B-EC40-A6A3-5366F3FBC6C2}"/>
+                </a:ext>
+              </a:extLst>
+            </p:cNvPr>
+            <p:cNvSpPr/>
+            <p:nvPr/>
+          </p:nvSpPr>
+          <p:spPr>
+            <a:xfrm>
+              <a:off x="5324307" y="2283658"/>
+              <a:ext cx="1604210" cy="994611"/>
+            </a:xfrm>
+            <a:prstGeom prst="ellipse">
+              <a:avLst/>
+            </a:prstGeom>
+            <a:solidFill>
+              <a:schemeClr val="accent1">
+                <a:alpha val="17000"/>
+              </a:schemeClr>
             </a:solidFill>
-          </a:ln>
-        </p:spPr>
-        <p:style>
-          <a:lnRef idx="2">
-            <a:schemeClr val="accent1">
-              <a:shade val="50000"/>
-            </a:schemeClr>
-          </a:lnRef>
-          <a:fillRef idx="1">
-            <a:schemeClr val="accent1"/>
-          </a:fillRef>
-          <a:effectRef idx="0">
-            <a:schemeClr val="accent1"/>
-          </a:effectRef>
-          <a:fontRef idx="minor">
-            <a:schemeClr val="lt1"/>
-          </a:fontRef>
-        </p:style>
-        <p:txBody>
-          <a:bodyPr rtlCol="0" anchor="ctr"/>
-          <a:lstStyle/>
-          <a:p>
-            <a:pPr algn="ctr"/>
-            <a:endParaRPr lang="en-GB" dirty="0"/>
-          </a:p>
-        </p:txBody>
-      </p:sp>
-      <p:sp>
-        <p:nvSpPr>
-          <p:cNvPr id="17" name="Oval 16">
-            <a:extLst>
-              <a:ext uri="{FF2B5EF4-FFF2-40B4-BE49-F238E27FC236}">
-                <a16:creationId xmlns:a16="http://schemas.microsoft.com/office/drawing/2014/main" id="{74FB0B7A-8C0B-EC40-A6A3-5366F3FBC6C2}"/>
-              </a:ext>
-            </a:extLst>
-          </p:cNvPr>
-          <p:cNvSpPr/>
-          <p:nvPr/>
-        </p:nvSpPr>
-        <p:spPr>
-          <a:xfrm>
-            <a:off x="5324307" y="2283658"/>
-            <a:ext cx="1604210" cy="994611"/>
-          </a:xfrm>
-          <a:prstGeom prst="ellipse">
-            <a:avLst/>
-          </a:prstGeom>
-          <a:solidFill>
-            <a:schemeClr val="accent1">
-              <a:alpha val="17000"/>
-            </a:schemeClr>
-          </a:solidFill>
-          <a:ln>
-            <a:solidFill>
+            <a:ln>
+              <a:solidFill>
+                <a:schemeClr val="accent1">
+                  <a:shade val="50000"/>
+                </a:schemeClr>
+              </a:solidFill>
+            </a:ln>
+          </p:spPr>
+          <p:style>
+            <a:lnRef idx="2">
               <a:schemeClr val="accent1">
                 <a:shade val="50000"/>
               </a:schemeClr>
+            </a:lnRef>
+            <a:fillRef idx="1">
+              <a:schemeClr val="accent1"/>
+            </a:fillRef>
+            <a:effectRef idx="0">
+              <a:schemeClr val="accent1"/>
+            </a:effectRef>
+            <a:fontRef idx="minor">
+              <a:schemeClr val="lt1"/>
+            </a:fontRef>
+          </p:style>
+          <p:txBody>
+            <a:bodyPr rtlCol="0" anchor="ctr"/>
+            <a:lstStyle/>
+            <a:p>
+              <a:pPr algn="ctr"/>
+              <a:endParaRPr lang="en-GB" dirty="0"/>
+            </a:p>
+          </p:txBody>
+        </p:sp>
+        <p:sp>
+          <p:nvSpPr>
+            <p:cNvPr id="18" name="Oval 17">
+              <a:extLst>
+                <a:ext uri="{FF2B5EF4-FFF2-40B4-BE49-F238E27FC236}">
+                  <a16:creationId xmlns:a16="http://schemas.microsoft.com/office/drawing/2014/main" id="{6CC03DCF-D7B2-B94E-BC33-6A855E33A079}"/>
+                </a:ext>
+              </a:extLst>
+            </p:cNvPr>
+            <p:cNvSpPr/>
+            <p:nvPr/>
+          </p:nvSpPr>
+          <p:spPr>
+            <a:xfrm>
+              <a:off x="8438148" y="2283659"/>
+              <a:ext cx="1604210" cy="994611"/>
+            </a:xfrm>
+            <a:prstGeom prst="ellipse">
+              <a:avLst/>
+            </a:prstGeom>
+            <a:solidFill>
+              <a:schemeClr val="accent1">
+                <a:alpha val="17000"/>
+              </a:schemeClr>
             </a:solidFill>
-          </a:ln>
-        </p:spPr>
-        <p:style>
-          <a:lnRef idx="2">
-            <a:schemeClr val="accent1">
-              <a:shade val="50000"/>
-            </a:schemeClr>
-          </a:lnRef>
-          <a:fillRef idx="1">
-            <a:schemeClr val="accent1"/>
-          </a:fillRef>
-          <a:effectRef idx="0">
-            <a:schemeClr val="accent1"/>
-          </a:effectRef>
-          <a:fontRef idx="minor">
-            <a:schemeClr val="lt1"/>
-          </a:fontRef>
-        </p:style>
-        <p:txBody>
-          <a:bodyPr rtlCol="0" anchor="ctr"/>
-          <a:lstStyle/>
-          <a:p>
-            <a:pPr algn="ctr"/>
-            <a:endParaRPr lang="en-GB" dirty="0"/>
-          </a:p>
-        </p:txBody>
-      </p:sp>
-      <p:sp>
-        <p:nvSpPr>
-          <p:cNvPr id="18" name="Oval 17">
-            <a:extLst>
-              <a:ext uri="{FF2B5EF4-FFF2-40B4-BE49-F238E27FC236}">
-                <a16:creationId xmlns:a16="http://schemas.microsoft.com/office/drawing/2014/main" id="{6CC03DCF-D7B2-B94E-BC33-6A855E33A079}"/>
-              </a:ext>
-            </a:extLst>
-          </p:cNvPr>
-          <p:cNvSpPr/>
-          <p:nvPr/>
-        </p:nvSpPr>
-        <p:spPr>
-          <a:xfrm>
-            <a:off x="8438148" y="2283659"/>
-            <a:ext cx="1604210" cy="994611"/>
-          </a:xfrm>
-          <a:prstGeom prst="ellipse">
-            <a:avLst/>
-          </a:prstGeom>
-          <a:solidFill>
-            <a:schemeClr val="accent1">
-              <a:alpha val="17000"/>
-            </a:schemeClr>
-          </a:solidFill>
-          <a:ln>
-            <a:solidFill>
+            <a:ln>
+              <a:solidFill>
+                <a:schemeClr val="accent1">
+                  <a:shade val="50000"/>
+                </a:schemeClr>
+              </a:solidFill>
+            </a:ln>
+          </p:spPr>
+          <p:style>
+            <a:lnRef idx="2">
               <a:schemeClr val="accent1">
                 <a:shade val="50000"/>
               </a:schemeClr>
-            </a:solidFill>
-          </a:ln>
-        </p:spPr>
-        <p:style>
-          <a:lnRef idx="2">
-            <a:schemeClr val="accent1">
-              <a:shade val="50000"/>
-            </a:schemeClr>
-          </a:lnRef>
-          <a:fillRef idx="1">
-            <a:schemeClr val="accent1"/>
-          </a:fillRef>
-          <a:effectRef idx="0">
-            <a:schemeClr val="accent1"/>
-          </a:effectRef>
-          <a:fontRef idx="minor">
-            <a:schemeClr val="lt1"/>
-          </a:fontRef>
-        </p:style>
-        <p:txBody>
-          <a:bodyPr rtlCol="0" anchor="ctr"/>
-          <a:lstStyle/>
-          <a:p>
-            <a:pPr algn="ctr"/>
-            <a:endParaRPr lang="en-GB" dirty="0"/>
-          </a:p>
-        </p:txBody>
-      </p:sp>
-      <p:pic>
-        <p:nvPicPr>
-          <p:cNvPr id="21" name="Picture 20">
-            <a:extLst>
-              <a:ext uri="{FF2B5EF4-FFF2-40B4-BE49-F238E27FC236}">
-                <a16:creationId xmlns:a16="http://schemas.microsoft.com/office/drawing/2014/main" id="{42507E8A-51FA-7A47-9F1F-5CF476A0298A}"/>
-              </a:ext>
-            </a:extLst>
-          </p:cNvPr>
-          <p:cNvPicPr>
-            <a:picLocks noChangeAspect="1"/>
-          </p:cNvPicPr>
-          <p:nvPr/>
-        </p:nvPicPr>
-        <p:blipFill>
-          <a:blip r:embed="rId3"/>
-          <a:stretch>
-            <a:fillRect/>
-          </a:stretch>
-        </p:blipFill>
-        <p:spPr>
-          <a:xfrm>
-            <a:off x="1556084" y="2614527"/>
-            <a:ext cx="355600" cy="279400"/>
-          </a:xfrm>
-          <a:prstGeom prst="rect">
-            <a:avLst/>
-          </a:prstGeom>
-        </p:spPr>
-      </p:pic>
-      <p:pic>
-        <p:nvPicPr>
-          <p:cNvPr id="24" name="Picture 23">
-            <a:extLst>
-              <a:ext uri="{FF2B5EF4-FFF2-40B4-BE49-F238E27FC236}">
-                <a16:creationId xmlns:a16="http://schemas.microsoft.com/office/drawing/2014/main" id="{0B8B726D-147F-0C4E-B54D-93CF64167085}"/>
-              </a:ext>
-            </a:extLst>
-          </p:cNvPr>
-          <p:cNvPicPr>
-            <a:picLocks noChangeAspect="1"/>
-          </p:cNvPicPr>
-          <p:nvPr/>
-        </p:nvPicPr>
-        <p:blipFill>
-          <a:blip r:embed="rId4"/>
-          <a:stretch>
-            <a:fillRect/>
-          </a:stretch>
-        </p:blipFill>
-        <p:spPr>
-          <a:xfrm>
-            <a:off x="4436143" y="2614527"/>
-            <a:ext cx="266700" cy="279400"/>
-          </a:xfrm>
-          <a:prstGeom prst="rect">
-            <a:avLst/>
-          </a:prstGeom>
-        </p:spPr>
-      </p:pic>
-      <p:pic>
-        <p:nvPicPr>
-          <p:cNvPr id="25" name="Picture 24">
-            <a:extLst>
-              <a:ext uri="{FF2B5EF4-FFF2-40B4-BE49-F238E27FC236}">
-                <a16:creationId xmlns:a16="http://schemas.microsoft.com/office/drawing/2014/main" id="{DA230C13-1768-3C4E-96C4-5BB1B3D7E655}"/>
-              </a:ext>
-            </a:extLst>
-          </p:cNvPr>
-          <p:cNvPicPr>
-            <a:picLocks noChangeAspect="1"/>
-          </p:cNvPicPr>
-          <p:nvPr/>
-        </p:nvPicPr>
-        <p:blipFill>
-          <a:blip r:embed="rId5"/>
-          <a:stretch>
-            <a:fillRect/>
-          </a:stretch>
-        </p:blipFill>
-        <p:spPr>
-          <a:xfrm>
-            <a:off x="7353133" y="2589127"/>
-            <a:ext cx="660400" cy="304800"/>
-          </a:xfrm>
-          <a:prstGeom prst="rect">
-            <a:avLst/>
-          </a:prstGeom>
-        </p:spPr>
-      </p:pic>
-      <p:pic>
-        <p:nvPicPr>
-          <p:cNvPr id="26" name="Picture 25">
-            <a:extLst>
-              <a:ext uri="{FF2B5EF4-FFF2-40B4-BE49-F238E27FC236}">
-                <a16:creationId xmlns:a16="http://schemas.microsoft.com/office/drawing/2014/main" id="{7FF9F1EB-B229-A144-BBAA-7EA29FE1F8D6}"/>
-              </a:ext>
-            </a:extLst>
-          </p:cNvPr>
-          <p:cNvPicPr>
-            <a:picLocks noChangeAspect="1"/>
-          </p:cNvPicPr>
-          <p:nvPr/>
-        </p:nvPicPr>
-        <p:blipFill>
-          <a:blip r:embed="rId6"/>
-          <a:stretch>
-            <a:fillRect/>
-          </a:stretch>
-        </p:blipFill>
-        <p:spPr>
-          <a:xfrm>
-            <a:off x="10450931" y="2589127"/>
-            <a:ext cx="584200" cy="304800"/>
-          </a:xfrm>
-          <a:prstGeom prst="rect">
-            <a:avLst/>
-          </a:prstGeom>
-        </p:spPr>
-      </p:pic>
-      <p:pic>
-        <p:nvPicPr>
-          <p:cNvPr id="27" name="Picture 26">
-            <a:extLst>
-              <a:ext uri="{FF2B5EF4-FFF2-40B4-BE49-F238E27FC236}">
-                <a16:creationId xmlns:a16="http://schemas.microsoft.com/office/drawing/2014/main" id="{DF40A83A-2E08-5B49-A07A-43EAFD565A41}"/>
-              </a:ext>
-            </a:extLst>
-          </p:cNvPr>
-          <p:cNvPicPr>
-            <a:picLocks noChangeAspect="1"/>
-          </p:cNvPicPr>
-          <p:nvPr/>
-        </p:nvPicPr>
-        <p:blipFill>
-          <a:blip r:embed="rId7"/>
-          <a:stretch>
-            <a:fillRect/>
-          </a:stretch>
-        </p:blipFill>
-        <p:spPr>
-          <a:xfrm>
-            <a:off x="10743031" y="1518489"/>
-            <a:ext cx="101600" cy="215900"/>
-          </a:xfrm>
-          <a:prstGeom prst="rect">
-            <a:avLst/>
-          </a:prstGeom>
-        </p:spPr>
-      </p:pic>
-      <p:pic>
-        <p:nvPicPr>
-          <p:cNvPr id="28" name="Picture 27">
-            <a:extLst>
-              <a:ext uri="{FF2B5EF4-FFF2-40B4-BE49-F238E27FC236}">
-                <a16:creationId xmlns:a16="http://schemas.microsoft.com/office/drawing/2014/main" id="{C3F49E90-1955-644C-BF48-A7838EC0EAF8}"/>
-              </a:ext>
-            </a:extLst>
-          </p:cNvPr>
-          <p:cNvPicPr>
-            <a:picLocks noChangeAspect="1"/>
-          </p:cNvPicPr>
-          <p:nvPr/>
-        </p:nvPicPr>
-        <p:blipFill>
-          <a:blip r:embed="rId8"/>
-          <a:stretch>
-            <a:fillRect/>
-          </a:stretch>
-        </p:blipFill>
-        <p:spPr>
-          <a:xfrm>
-            <a:off x="6043862" y="2644938"/>
-            <a:ext cx="165100" cy="304800"/>
-          </a:xfrm>
-          <a:prstGeom prst="rect">
-            <a:avLst/>
-          </a:prstGeom>
-        </p:spPr>
-      </p:pic>
-      <p:pic>
-        <p:nvPicPr>
-          <p:cNvPr id="30" name="Picture 29">
-            <a:extLst>
-              <a:ext uri="{FF2B5EF4-FFF2-40B4-BE49-F238E27FC236}">
-                <a16:creationId xmlns:a16="http://schemas.microsoft.com/office/drawing/2014/main" id="{B4A87D7B-C67C-C149-B2BD-131CB7A47A29}"/>
-              </a:ext>
-            </a:extLst>
-          </p:cNvPr>
-          <p:cNvPicPr>
-            <a:picLocks noChangeAspect="1"/>
-          </p:cNvPicPr>
-          <p:nvPr/>
-        </p:nvPicPr>
-        <p:blipFill>
-          <a:blip r:embed="rId9"/>
-          <a:stretch>
-            <a:fillRect/>
-          </a:stretch>
-        </p:blipFill>
-        <p:spPr>
-          <a:xfrm>
-            <a:off x="2922500" y="2657974"/>
-            <a:ext cx="152400" cy="215900"/>
-          </a:xfrm>
-          <a:prstGeom prst="rect">
-            <a:avLst/>
-          </a:prstGeom>
-        </p:spPr>
-      </p:pic>
-      <p:pic>
-        <p:nvPicPr>
-          <p:cNvPr id="31" name="Picture 30">
-            <a:extLst>
-              <a:ext uri="{FF2B5EF4-FFF2-40B4-BE49-F238E27FC236}">
-                <a16:creationId xmlns:a16="http://schemas.microsoft.com/office/drawing/2014/main" id="{480DAE54-8924-3146-A43F-5E37C6C7FC5A}"/>
-              </a:ext>
-            </a:extLst>
-          </p:cNvPr>
-          <p:cNvPicPr>
-            <a:picLocks noChangeAspect="1"/>
-          </p:cNvPicPr>
-          <p:nvPr/>
-        </p:nvPicPr>
-        <p:blipFill>
-          <a:blip r:embed="rId9"/>
-          <a:stretch>
-            <a:fillRect/>
-          </a:stretch>
-        </p:blipFill>
-        <p:spPr>
-          <a:xfrm>
-            <a:off x="9164053" y="2678027"/>
-            <a:ext cx="152400" cy="215900"/>
-          </a:xfrm>
-          <a:prstGeom prst="rect">
-            <a:avLst/>
-          </a:prstGeom>
-        </p:spPr>
-      </p:pic>
-      <p:sp>
-        <p:nvSpPr>
-          <p:cNvPr id="32" name="TextBox 31">
-            <a:extLst>
-              <a:ext uri="{FF2B5EF4-FFF2-40B4-BE49-F238E27FC236}">
-                <a16:creationId xmlns:a16="http://schemas.microsoft.com/office/drawing/2014/main" id="{72B41536-3DB0-C14B-87E3-49AC92063951}"/>
-              </a:ext>
-            </a:extLst>
-          </p:cNvPr>
-          <p:cNvSpPr txBox="1"/>
-          <p:nvPr/>
-        </p:nvSpPr>
-        <p:spPr>
-          <a:xfrm>
-            <a:off x="2259105" y="3467919"/>
-            <a:ext cx="1536190" cy="369332"/>
-          </a:xfrm>
-          <a:prstGeom prst="rect">
-            <a:avLst/>
-          </a:prstGeom>
-          <a:noFill/>
-        </p:spPr>
-        <p:txBody>
-          <a:bodyPr wrap="none" rtlCol="0">
-            <a:spAutoFit/>
-          </a:bodyPr>
-          <a:lstStyle/>
-          <a:p>
-            <a:r>
-              <a:rPr lang="en-GB" dirty="0"/>
-              <a:t>Non-breeding</a:t>
-            </a:r>
-          </a:p>
-        </p:txBody>
-      </p:sp>
-      <p:sp>
-        <p:nvSpPr>
-          <p:cNvPr id="33" name="TextBox 32">
-            <a:extLst>
-              <a:ext uri="{FF2B5EF4-FFF2-40B4-BE49-F238E27FC236}">
-                <a16:creationId xmlns:a16="http://schemas.microsoft.com/office/drawing/2014/main" id="{8903F010-7DA0-8A46-BA2C-87CCF177DBE9}"/>
-              </a:ext>
-            </a:extLst>
-          </p:cNvPr>
-          <p:cNvSpPr txBox="1"/>
-          <p:nvPr/>
-        </p:nvSpPr>
-        <p:spPr>
-          <a:xfrm>
-            <a:off x="8472158" y="3500334"/>
-            <a:ext cx="1536190" cy="369332"/>
-          </a:xfrm>
-          <a:prstGeom prst="rect">
-            <a:avLst/>
-          </a:prstGeom>
-          <a:noFill/>
-        </p:spPr>
-        <p:txBody>
-          <a:bodyPr wrap="none" rtlCol="0">
-            <a:spAutoFit/>
-          </a:bodyPr>
-          <a:lstStyle/>
-          <a:p>
-            <a:r>
-              <a:rPr lang="en-GB" dirty="0"/>
-              <a:t>Non-breeding</a:t>
-            </a:r>
-          </a:p>
-        </p:txBody>
-      </p:sp>
-      <p:sp>
-        <p:nvSpPr>
-          <p:cNvPr id="34" name="TextBox 33">
-            <a:extLst>
-              <a:ext uri="{FF2B5EF4-FFF2-40B4-BE49-F238E27FC236}">
-                <a16:creationId xmlns:a16="http://schemas.microsoft.com/office/drawing/2014/main" id="{D53B8944-D225-1740-8182-6AB21CDA9702}"/>
-              </a:ext>
-            </a:extLst>
-          </p:cNvPr>
-          <p:cNvSpPr txBox="1"/>
-          <p:nvPr/>
-        </p:nvSpPr>
-        <p:spPr>
-          <a:xfrm>
-            <a:off x="5614797" y="3452207"/>
-            <a:ext cx="1023229" cy="369332"/>
-          </a:xfrm>
-          <a:prstGeom prst="rect">
-            <a:avLst/>
-          </a:prstGeom>
-          <a:noFill/>
-        </p:spPr>
-        <p:txBody>
-          <a:bodyPr wrap="none" rtlCol="0">
-            <a:spAutoFit/>
-          </a:bodyPr>
-          <a:lstStyle/>
-          <a:p>
-            <a:r>
-              <a:rPr lang="en-GB" dirty="0"/>
-              <a:t>Breeding</a:t>
-            </a:r>
-          </a:p>
-        </p:txBody>
-      </p:sp>
+            </a:lnRef>
+            <a:fillRef idx="1">
+              <a:schemeClr val="accent1"/>
+            </a:fillRef>
+            <a:effectRef idx="0">
+              <a:schemeClr val="accent1"/>
+            </a:effectRef>
+            <a:fontRef idx="minor">
+              <a:schemeClr val="lt1"/>
+            </a:fontRef>
+          </p:style>
+          <p:txBody>
+            <a:bodyPr rtlCol="0" anchor="ctr"/>
+            <a:lstStyle/>
+            <a:p>
+              <a:pPr algn="ctr"/>
+              <a:endParaRPr lang="en-GB" dirty="0"/>
+            </a:p>
+          </p:txBody>
+        </p:sp>
+        <p:pic>
+          <p:nvPicPr>
+            <p:cNvPr id="21" name="Picture 20">
+              <a:extLst>
+                <a:ext uri="{FF2B5EF4-FFF2-40B4-BE49-F238E27FC236}">
+                  <a16:creationId xmlns:a16="http://schemas.microsoft.com/office/drawing/2014/main" id="{42507E8A-51FA-7A47-9F1F-5CF476A0298A}"/>
+                </a:ext>
+              </a:extLst>
+            </p:cNvPr>
+            <p:cNvPicPr>
+              <a:picLocks noChangeAspect="1"/>
+            </p:cNvPicPr>
+            <p:nvPr/>
+          </p:nvPicPr>
+          <p:blipFill>
+            <a:blip r:embed="rId3"/>
+            <a:stretch>
+              <a:fillRect/>
+            </a:stretch>
+          </p:blipFill>
+          <p:spPr>
+            <a:xfrm>
+              <a:off x="1556084" y="2614527"/>
+              <a:ext cx="355600" cy="279400"/>
+            </a:xfrm>
+            <a:prstGeom prst="rect">
+              <a:avLst/>
+            </a:prstGeom>
+          </p:spPr>
+        </p:pic>
+        <p:pic>
+          <p:nvPicPr>
+            <p:cNvPr id="24" name="Picture 23">
+              <a:extLst>
+                <a:ext uri="{FF2B5EF4-FFF2-40B4-BE49-F238E27FC236}">
+                  <a16:creationId xmlns:a16="http://schemas.microsoft.com/office/drawing/2014/main" id="{0B8B726D-147F-0C4E-B54D-93CF64167085}"/>
+                </a:ext>
+              </a:extLst>
+            </p:cNvPr>
+            <p:cNvPicPr>
+              <a:picLocks noChangeAspect="1"/>
+            </p:cNvPicPr>
+            <p:nvPr/>
+          </p:nvPicPr>
+          <p:blipFill>
+            <a:blip r:embed="rId4"/>
+            <a:stretch>
+              <a:fillRect/>
+            </a:stretch>
+          </p:blipFill>
+          <p:spPr>
+            <a:xfrm>
+              <a:off x="4436143" y="2614527"/>
+              <a:ext cx="266700" cy="279400"/>
+            </a:xfrm>
+            <a:prstGeom prst="rect">
+              <a:avLst/>
+            </a:prstGeom>
+          </p:spPr>
+        </p:pic>
+        <p:pic>
+          <p:nvPicPr>
+            <p:cNvPr id="25" name="Picture 24">
+              <a:extLst>
+                <a:ext uri="{FF2B5EF4-FFF2-40B4-BE49-F238E27FC236}">
+                  <a16:creationId xmlns:a16="http://schemas.microsoft.com/office/drawing/2014/main" id="{DA230C13-1768-3C4E-96C4-5BB1B3D7E655}"/>
+                </a:ext>
+              </a:extLst>
+            </p:cNvPr>
+            <p:cNvPicPr>
+              <a:picLocks noChangeAspect="1"/>
+            </p:cNvPicPr>
+            <p:nvPr/>
+          </p:nvPicPr>
+          <p:blipFill>
+            <a:blip r:embed="rId5"/>
+            <a:stretch>
+              <a:fillRect/>
+            </a:stretch>
+          </p:blipFill>
+          <p:spPr>
+            <a:xfrm>
+              <a:off x="7353133" y="2589127"/>
+              <a:ext cx="660400" cy="304800"/>
+            </a:xfrm>
+            <a:prstGeom prst="rect">
+              <a:avLst/>
+            </a:prstGeom>
+          </p:spPr>
+        </p:pic>
+        <p:pic>
+          <p:nvPicPr>
+            <p:cNvPr id="26" name="Picture 25">
+              <a:extLst>
+                <a:ext uri="{FF2B5EF4-FFF2-40B4-BE49-F238E27FC236}">
+                  <a16:creationId xmlns:a16="http://schemas.microsoft.com/office/drawing/2014/main" id="{7FF9F1EB-B229-A144-BBAA-7EA29FE1F8D6}"/>
+                </a:ext>
+              </a:extLst>
+            </p:cNvPr>
+            <p:cNvPicPr>
+              <a:picLocks noChangeAspect="1"/>
+            </p:cNvPicPr>
+            <p:nvPr/>
+          </p:nvPicPr>
+          <p:blipFill>
+            <a:blip r:embed="rId6"/>
+            <a:stretch>
+              <a:fillRect/>
+            </a:stretch>
+          </p:blipFill>
+          <p:spPr>
+            <a:xfrm>
+              <a:off x="10450931" y="2589127"/>
+              <a:ext cx="584200" cy="304800"/>
+            </a:xfrm>
+            <a:prstGeom prst="rect">
+              <a:avLst/>
+            </a:prstGeom>
+          </p:spPr>
+        </p:pic>
+        <p:pic>
+          <p:nvPicPr>
+            <p:cNvPr id="27" name="Picture 26">
+              <a:extLst>
+                <a:ext uri="{FF2B5EF4-FFF2-40B4-BE49-F238E27FC236}">
+                  <a16:creationId xmlns:a16="http://schemas.microsoft.com/office/drawing/2014/main" id="{DF40A83A-2E08-5B49-A07A-43EAFD565A41}"/>
+                </a:ext>
+              </a:extLst>
+            </p:cNvPr>
+            <p:cNvPicPr>
+              <a:picLocks noChangeAspect="1"/>
+            </p:cNvPicPr>
+            <p:nvPr/>
+          </p:nvPicPr>
+          <p:blipFill>
+            <a:blip r:embed="rId7"/>
+            <a:stretch>
+              <a:fillRect/>
+            </a:stretch>
+          </p:blipFill>
+          <p:spPr>
+            <a:xfrm>
+              <a:off x="10743031" y="1518489"/>
+              <a:ext cx="101600" cy="215900"/>
+            </a:xfrm>
+            <a:prstGeom prst="rect">
+              <a:avLst/>
+            </a:prstGeom>
+          </p:spPr>
+        </p:pic>
+        <p:pic>
+          <p:nvPicPr>
+            <p:cNvPr id="28" name="Picture 27">
+              <a:extLst>
+                <a:ext uri="{FF2B5EF4-FFF2-40B4-BE49-F238E27FC236}">
+                  <a16:creationId xmlns:a16="http://schemas.microsoft.com/office/drawing/2014/main" id="{C3F49E90-1955-644C-BF48-A7838EC0EAF8}"/>
+                </a:ext>
+              </a:extLst>
+            </p:cNvPr>
+            <p:cNvPicPr>
+              <a:picLocks noChangeAspect="1"/>
+            </p:cNvPicPr>
+            <p:nvPr/>
+          </p:nvPicPr>
+          <p:blipFill>
+            <a:blip r:embed="rId8"/>
+            <a:stretch>
+              <a:fillRect/>
+            </a:stretch>
+          </p:blipFill>
+          <p:spPr>
+            <a:xfrm>
+              <a:off x="6043862" y="2644938"/>
+              <a:ext cx="165100" cy="304800"/>
+            </a:xfrm>
+            <a:prstGeom prst="rect">
+              <a:avLst/>
+            </a:prstGeom>
+          </p:spPr>
+        </p:pic>
+        <p:pic>
+          <p:nvPicPr>
+            <p:cNvPr id="30" name="Picture 29">
+              <a:extLst>
+                <a:ext uri="{FF2B5EF4-FFF2-40B4-BE49-F238E27FC236}">
+                  <a16:creationId xmlns:a16="http://schemas.microsoft.com/office/drawing/2014/main" id="{B4A87D7B-C67C-C149-B2BD-131CB7A47A29}"/>
+                </a:ext>
+              </a:extLst>
+            </p:cNvPr>
+            <p:cNvPicPr>
+              <a:picLocks noChangeAspect="1"/>
+            </p:cNvPicPr>
+            <p:nvPr/>
+          </p:nvPicPr>
+          <p:blipFill>
+            <a:blip r:embed="rId9"/>
+            <a:stretch>
+              <a:fillRect/>
+            </a:stretch>
+          </p:blipFill>
+          <p:spPr>
+            <a:xfrm>
+              <a:off x="2922500" y="2657974"/>
+              <a:ext cx="152400" cy="215900"/>
+            </a:xfrm>
+            <a:prstGeom prst="rect">
+              <a:avLst/>
+            </a:prstGeom>
+          </p:spPr>
+        </p:pic>
+        <p:pic>
+          <p:nvPicPr>
+            <p:cNvPr id="31" name="Picture 30">
+              <a:extLst>
+                <a:ext uri="{FF2B5EF4-FFF2-40B4-BE49-F238E27FC236}">
+                  <a16:creationId xmlns:a16="http://schemas.microsoft.com/office/drawing/2014/main" id="{480DAE54-8924-3146-A43F-5E37C6C7FC5A}"/>
+                </a:ext>
+              </a:extLst>
+            </p:cNvPr>
+            <p:cNvPicPr>
+              <a:picLocks noChangeAspect="1"/>
+            </p:cNvPicPr>
+            <p:nvPr/>
+          </p:nvPicPr>
+          <p:blipFill>
+            <a:blip r:embed="rId9"/>
+            <a:stretch>
+              <a:fillRect/>
+            </a:stretch>
+          </p:blipFill>
+          <p:spPr>
+            <a:xfrm>
+              <a:off x="9164053" y="2678027"/>
+              <a:ext cx="152400" cy="215900"/>
+            </a:xfrm>
+            <a:prstGeom prst="rect">
+              <a:avLst/>
+            </a:prstGeom>
+          </p:spPr>
+        </p:pic>
+        <p:sp>
+          <p:nvSpPr>
+            <p:cNvPr id="32" name="TextBox 31">
+              <a:extLst>
+                <a:ext uri="{FF2B5EF4-FFF2-40B4-BE49-F238E27FC236}">
+                  <a16:creationId xmlns:a16="http://schemas.microsoft.com/office/drawing/2014/main" id="{72B41536-3DB0-C14B-87E3-49AC92063951}"/>
+                </a:ext>
+              </a:extLst>
+            </p:cNvPr>
+            <p:cNvSpPr txBox="1"/>
+            <p:nvPr/>
+          </p:nvSpPr>
+          <p:spPr>
+            <a:xfrm>
+              <a:off x="2259105" y="3467919"/>
+              <a:ext cx="1536190" cy="369332"/>
+            </a:xfrm>
+            <a:prstGeom prst="rect">
+              <a:avLst/>
+            </a:prstGeom>
+            <a:noFill/>
+          </p:spPr>
+          <p:txBody>
+            <a:bodyPr wrap="none" rtlCol="0">
+              <a:spAutoFit/>
+            </a:bodyPr>
+            <a:lstStyle/>
+            <a:p>
+              <a:r>
+                <a:rPr lang="en-GB" dirty="0"/>
+                <a:t>Non-breeding</a:t>
+              </a:r>
+            </a:p>
+          </p:txBody>
+        </p:sp>
+        <p:sp>
+          <p:nvSpPr>
+            <p:cNvPr id="33" name="TextBox 32">
+              <a:extLst>
+                <a:ext uri="{FF2B5EF4-FFF2-40B4-BE49-F238E27FC236}">
+                  <a16:creationId xmlns:a16="http://schemas.microsoft.com/office/drawing/2014/main" id="{8903F010-7DA0-8A46-BA2C-87CCF177DBE9}"/>
+                </a:ext>
+              </a:extLst>
+            </p:cNvPr>
+            <p:cNvSpPr txBox="1"/>
+            <p:nvPr/>
+          </p:nvSpPr>
+          <p:spPr>
+            <a:xfrm>
+              <a:off x="8472158" y="3500334"/>
+              <a:ext cx="1536190" cy="369332"/>
+            </a:xfrm>
+            <a:prstGeom prst="rect">
+              <a:avLst/>
+            </a:prstGeom>
+            <a:noFill/>
+          </p:spPr>
+          <p:txBody>
+            <a:bodyPr wrap="none" rtlCol="0">
+              <a:spAutoFit/>
+            </a:bodyPr>
+            <a:lstStyle/>
+            <a:p>
+              <a:r>
+                <a:rPr lang="en-GB" dirty="0"/>
+                <a:t>Non-breeding</a:t>
+              </a:r>
+            </a:p>
+          </p:txBody>
+        </p:sp>
+        <p:sp>
+          <p:nvSpPr>
+            <p:cNvPr id="34" name="TextBox 33">
+              <a:extLst>
+                <a:ext uri="{FF2B5EF4-FFF2-40B4-BE49-F238E27FC236}">
+                  <a16:creationId xmlns:a16="http://schemas.microsoft.com/office/drawing/2014/main" id="{D53B8944-D225-1740-8182-6AB21CDA9702}"/>
+                </a:ext>
+              </a:extLst>
+            </p:cNvPr>
+            <p:cNvSpPr txBox="1"/>
+            <p:nvPr/>
+          </p:nvSpPr>
+          <p:spPr>
+            <a:xfrm>
+              <a:off x="5614797" y="3452207"/>
+              <a:ext cx="1023229" cy="369332"/>
+            </a:xfrm>
+            <a:prstGeom prst="rect">
+              <a:avLst/>
+            </a:prstGeom>
+            <a:noFill/>
+          </p:spPr>
+          <p:txBody>
+            <a:bodyPr wrap="none" rtlCol="0">
+              <a:spAutoFit/>
+            </a:bodyPr>
+            <a:lstStyle/>
+            <a:p>
+              <a:r>
+                <a:rPr lang="en-GB" dirty="0"/>
+                <a:t>Breeding</a:t>
+              </a:r>
+            </a:p>
+          </p:txBody>
+        </p:sp>
+      </p:grpSp>
     </p:spTree>
     <p:extLst>
       <p:ext uri="{BB962C8B-B14F-4D97-AF65-F5344CB8AC3E}">

</xml_diff>